<commit_message>
edit cases.pptx; add camtasia sources for contradiction, cases
</commit_message>
<xml_diff>
--- a/spring13/slides/cases.pptx
+++ b/spring13/slides/cases.pptx
@@ -8264,91 +8264,7 @@
   <p:timing>
     <p:tnLst>
       <p:par>
-        <p:cTn xmlns:p14="http://schemas.microsoft.com/office/powerpoint/2010/main" id="1" dur="indefinite" restart="never" nodeType="tmRoot">
-          <p:childTnLst>
-            <p:seq concurrent="1" nextAc="seek">
-              <p:cTn id="2" dur="indefinite" nodeType="mainSeq">
-                <p:childTnLst>
-                  <p:par>
-                    <p:cTn id="3" fill="hold">
-                      <p:stCondLst>
-                        <p:cond delay="indefinite"/>
-                      </p:stCondLst>
-                      <p:childTnLst>
-                        <p:par>
-                          <p:cTn id="4" fill="hold">
-                            <p:stCondLst>
-                              <p:cond delay="0"/>
-                            </p:stCondLst>
-                            <p:childTnLst>
-                              <p:par>
-                                <p:cTn id="5" presetID="10" presetClass="entr" presetSubtype="0" fill="hold" nodeType="clickEffect">
-                                  <p:stCondLst>
-                                    <p:cond delay="0"/>
-                                  </p:stCondLst>
-                                  <p:childTnLst>
-                                    <p:set>
-                                      <p:cBhvr>
-                                        <p:cTn id="6" dur="1" fill="hold">
-                                          <p:stCondLst>
-                                            <p:cond delay="0"/>
-                                          </p:stCondLst>
-                                        </p:cTn>
-                                        <p:tgtEl>
-                                          <p:spTgt spid="6">
-                                            <p:txEl>
-                                              <p:pRg st="0" end="0"/>
-                                            </p:txEl>
-                                          </p:spTgt>
-                                        </p:tgtEl>
-                                        <p:attrNameLst>
-                                          <p:attrName>style.visibility</p:attrName>
-                                        </p:attrNameLst>
-                                      </p:cBhvr>
-                                      <p:to>
-                                        <p:strVal val="visible"/>
-                                      </p:to>
-                                    </p:set>
-                                    <p:animEffect transition="in" filter="fade">
-                                      <p:cBhvr>
-                                        <p:cTn id="7" dur="500"/>
-                                        <p:tgtEl>
-                                          <p:spTgt spid="6">
-                                            <p:txEl>
-                                              <p:pRg st="0" end="0"/>
-                                            </p:txEl>
-                                          </p:spTgt>
-                                        </p:tgtEl>
-                                      </p:cBhvr>
-                                    </p:animEffect>
-                                  </p:childTnLst>
-                                </p:cTn>
-                              </p:par>
-                            </p:childTnLst>
-                          </p:cTn>
-                        </p:par>
-                      </p:childTnLst>
-                    </p:cTn>
-                  </p:par>
-                </p:childTnLst>
-              </p:cTn>
-              <p:prevCondLst>
-                <p:cond evt="onPrev" delay="0">
-                  <p:tgtEl>
-                    <p:sldTgt/>
-                  </p:tgtEl>
-                </p:cond>
-              </p:prevCondLst>
-              <p:nextCondLst>
-                <p:cond evt="onNext" delay="0">
-                  <p:tgtEl>
-                    <p:sldTgt/>
-                  </p:tgtEl>
-                </p:cond>
-              </p:nextCondLst>
-            </p:seq>
-          </p:childTnLst>
-        </p:cTn>
+        <p:cTn xmlns:p14="http://schemas.microsoft.com/office/powerpoint/2010/main" id="1" dur="indefinite" restart="never" nodeType="tmRoot"/>
       </p:par>
     </p:tnLst>
   </p:timing>
@@ -8859,7 +8775,7 @@
             <a:graphicData uri="http://schemas.openxmlformats.org/presentationml/2006/ole">
               <mc:AlternateContent xmlns:mc="http://schemas.openxmlformats.org/markup-compatibility/2006">
                 <mc:Choice xmlns:v="urn:schemas-microsoft-com:vml" Requires="v">
-                  <p:oleObj spid="_x0000_s350264" name="Equation" r:id="rId4" imgW="228600" imgH="457200" progId="Equation.DSMT4">
+                  <p:oleObj spid="_x0000_s350270" name="Equation" r:id="rId4" imgW="228600" imgH="457200" progId="Equation.DSMT4">
                     <p:embed/>
                   </p:oleObj>
                 </mc:Choice>
@@ -8980,7 +8896,7 @@
             <a:graphicData uri="http://schemas.openxmlformats.org/presentationml/2006/ole">
               <mc:AlternateContent xmlns:mc="http://schemas.openxmlformats.org/markup-compatibility/2006">
                 <mc:Choice xmlns:v="urn:schemas-microsoft-com:vml" Requires="v">
-                  <p:oleObj spid="_x0000_s350265" name="Equation" r:id="rId6" imgW="279400" imgH="457200" progId="Equation.DSMT4">
+                  <p:oleObj spid="_x0000_s350271" name="Equation" r:id="rId6" imgW="279400" imgH="457200" progId="Equation.DSMT4">
                     <p:embed/>
                   </p:oleObj>
                 </mc:Choice>
@@ -9757,7 +9673,7 @@
           <a:graphicData uri="http://schemas.openxmlformats.org/presentationml/2006/ole">
             <mc:AlternateContent xmlns:mc="http://schemas.openxmlformats.org/markup-compatibility/2006">
               <mc:Choice xmlns:v="urn:schemas-microsoft-com:vml" Requires="v">
-                <p:oleObj spid="_x0000_s352358" name="Equation" r:id="rId4" imgW="139700" imgH="228600" progId="Equation.DSMT4">
+                <p:oleObj spid="_x0000_s352370" name="Equation" r:id="rId4" imgW="139700" imgH="228600" progId="Equation.DSMT4">
                   <p:embed/>
                 </p:oleObj>
               </mc:Choice>
@@ -9999,17 +9915,23 @@
               <p:cNvGraphicFramePr>
                 <a:graphicFrameLocks noChangeAspect="1"/>
               </p:cNvGraphicFramePr>
-              <p:nvPr/>
+              <p:nvPr>
+                <p:extLst>
+                  <p:ext uri="{D42A27DB-BD31-4B8C-83A1-F6EECF244321}">
+                    <p14:modId xmlns:p14="http://schemas.microsoft.com/office/powerpoint/2010/main" val="453012981"/>
+                  </p:ext>
+                </p:extLst>
+              </p:nvPr>
             </p:nvGraphicFramePr>
             <p:xfrm>
-              <a:off x="3098192" y="1721588"/>
+              <a:off x="3087782" y="1721588"/>
               <a:ext cx="545733" cy="1093760"/>
             </p:xfrm>
             <a:graphic>
               <a:graphicData uri="http://schemas.openxmlformats.org/presentationml/2006/ole">
                 <mc:AlternateContent xmlns:mc="http://schemas.openxmlformats.org/markup-compatibility/2006">
                   <mc:Choice xmlns:v="urn:schemas-microsoft-com:vml" Requires="v">
-                    <p:oleObj spid="_x0000_s352359" name="Equation" r:id="rId6" imgW="228600" imgH="457200" progId="Equation.DSMT4">
+                    <p:oleObj spid="_x0000_s352371" name="Equation" r:id="rId6" imgW="228600" imgH="457200" progId="Equation.DSMT4">
                       <p:embed/>
                     </p:oleObj>
                   </mc:Choice>
@@ -10039,7 +9961,7 @@
                         </p:blipFill>
                         <p:spPr bwMode="auto">
                           <a:xfrm>
-                            <a:off x="3098192" y="1721588"/>
+                            <a:off x="3087782" y="1721588"/>
                             <a:ext cx="545733" cy="1093760"/>
                           </a:xfrm>
                           <a:prstGeom prst="rect">
@@ -10130,7 +10052,7 @@
               <a:graphicData uri="http://schemas.openxmlformats.org/presentationml/2006/ole">
                 <mc:AlternateContent xmlns:mc="http://schemas.openxmlformats.org/markup-compatibility/2006">
                   <mc:Choice xmlns:v="urn:schemas-microsoft-com:vml" Requires="v">
-                    <p:oleObj spid="_x0000_s352360" name="Equation" r:id="rId8" imgW="228600" imgH="457200" progId="Equation.DSMT4">
+                    <p:oleObj spid="_x0000_s352372" name="Equation" r:id="rId8" imgW="228600" imgH="457200" progId="Equation.DSMT4">
                       <p:embed/>
                     </p:oleObj>
                   </mc:Choice>
@@ -10251,7 +10173,7 @@
               <a:graphicData uri="http://schemas.openxmlformats.org/presentationml/2006/ole">
                 <mc:AlternateContent xmlns:mc="http://schemas.openxmlformats.org/markup-compatibility/2006">
                   <mc:Choice xmlns:v="urn:schemas-microsoft-com:vml" Requires="v">
-                    <p:oleObj spid="_x0000_s352361" name="Equation" r:id="rId10" imgW="279400" imgH="457200" progId="Equation.DSMT4">
+                    <p:oleObj spid="_x0000_s352373" name="Equation" r:id="rId10" imgW="279400" imgH="457200" progId="Equation.DSMT4">
                       <p:embed/>
                     </p:oleObj>
                   </mc:Choice>
@@ -11139,7 +11061,7 @@
               <a:graphicData uri="http://schemas.openxmlformats.org/presentationml/2006/ole">
                 <mc:AlternateContent xmlns:mc="http://schemas.openxmlformats.org/markup-compatibility/2006">
                   <mc:Choice xmlns:v="urn:schemas-microsoft-com:vml" Requires="v">
-                    <p:oleObj spid="_x0000_s354382" name="Equation" r:id="rId4" imgW="228600" imgH="457200" progId="Equation.DSMT4">
+                    <p:oleObj spid="_x0000_s354391" name="Equation" r:id="rId4" imgW="228600" imgH="457200" progId="Equation.DSMT4">
                       <p:embed/>
                     </p:oleObj>
                   </mc:Choice>
@@ -11260,7 +11182,7 @@
               <a:graphicData uri="http://schemas.openxmlformats.org/presentationml/2006/ole">
                 <mc:AlternateContent xmlns:mc="http://schemas.openxmlformats.org/markup-compatibility/2006">
                   <mc:Choice xmlns:v="urn:schemas-microsoft-com:vml" Requires="v">
-                    <p:oleObj spid="_x0000_s354383" name="Equation" r:id="rId6" imgW="228600" imgH="457200" progId="Equation.DSMT4">
+                    <p:oleObj spid="_x0000_s354392" name="Equation" r:id="rId6" imgW="228600" imgH="457200" progId="Equation.DSMT4">
                       <p:embed/>
                     </p:oleObj>
                   </mc:Choice>
@@ -11381,7 +11303,7 @@
               <a:graphicData uri="http://schemas.openxmlformats.org/presentationml/2006/ole">
                 <mc:AlternateContent xmlns:mc="http://schemas.openxmlformats.org/markup-compatibility/2006">
                   <mc:Choice xmlns:v="urn:schemas-microsoft-com:vml" Requires="v">
-                    <p:oleObj spid="_x0000_s354384" name="Equation" r:id="rId8" imgW="279400" imgH="457200" progId="Equation.DSMT4">
+                    <p:oleObj spid="_x0000_s354393" name="Equation" r:id="rId8" imgW="279400" imgH="457200" progId="Equation.DSMT4">
                       <p:embed/>
                     </p:oleObj>
                   </mc:Choice>
@@ -11442,9 +11364,18 @@
   <p:clrMapOvr>
     <a:masterClrMapping/>
   </p:clrMapOvr>
-  <p:transition xmlns:p14="http://schemas.microsoft.com/office/powerpoint/2010/main" spd="slow" advClick="0">
-    <p:fade/>
-  </p:transition>
+  <mc:AlternateContent xmlns:mc="http://schemas.openxmlformats.org/markup-compatibility/2006">
+    <mc:Choice xmlns:p14="http://schemas.microsoft.com/office/powerpoint/2010/main" Requires="p14">
+      <p:transition spd="slow" p14:dur="800" advClick="0">
+        <p:fade thruBlk="1"/>
+      </p:transition>
+    </mc:Choice>
+    <mc:Fallback>
+      <p:transition xmlns:p14="http://schemas.microsoft.com/office/powerpoint/2010/main" spd="slow" advClick="0">
+        <p:fade thruBlk="1"/>
+      </p:transition>
+    </mc:Fallback>
+  </mc:AlternateContent>
   <p:timing>
     <p:tnLst>
       <p:par>
@@ -11979,7 +11910,7 @@
             <a:graphicData uri="http://schemas.openxmlformats.org/presentationml/2006/ole">
               <mc:AlternateContent xmlns:mc="http://schemas.openxmlformats.org/markup-compatibility/2006">
                 <mc:Choice xmlns:v="urn:schemas-microsoft-com:vml" Requires="v">
-                  <p:oleObj spid="_x0000_s356389" name="Equation" r:id="rId4" imgW="279400" imgH="457200" progId="Equation.DSMT4">
+                  <p:oleObj spid="_x0000_s356392" name="Equation" r:id="rId4" imgW="279400" imgH="457200" progId="Equation.DSMT4">
                     <p:embed/>
                   </p:oleObj>
                 </mc:Choice>
@@ -12705,13 +12636,19 @@
               <a:rPr lang="en-US" sz="4400" dirty="0">
                 <a:latin typeface="Comic Sans MS" pitchFamily="66" charset="0"/>
               </a:rPr>
-              <a:t>by cases can </a:t>
+              <a:t>by </a:t>
             </a:r>
             <a:r>
               <a:rPr lang="en-US" sz="4400" dirty="0" smtClean="0">
                 <a:latin typeface="Comic Sans MS" pitchFamily="66" charset="0"/>
               </a:rPr>
-              <a:t>break a complicated </a:t>
+              <a:t>cases breaks </a:t>
+            </a:r>
+            <a:r>
+              <a:rPr lang="en-US" sz="4400" dirty="0" smtClean="0">
+                <a:latin typeface="Comic Sans MS" pitchFamily="66" charset="0"/>
+              </a:rPr>
+              <a:t>a complicated </a:t>
             </a:r>
             <a:r>
               <a:rPr lang="en-US" sz="4400" dirty="0">
@@ -12861,9 +12798,18 @@
   <p:clrMapOvr>
     <a:masterClrMapping/>
   </p:clrMapOvr>
-  <p:transition xmlns:p14="http://schemas.microsoft.com/office/powerpoint/2010/main" advClick="0">
-    <p:fade thruBlk="1"/>
-  </p:transition>
+  <mc:AlternateContent xmlns:mc="http://schemas.openxmlformats.org/markup-compatibility/2006">
+    <mc:Choice xmlns:p14="http://schemas.microsoft.com/office/powerpoint/2010/main" Requires="p14">
+      <p:transition spd="slow" p14:dur="900" advClick="0">
+        <p:fade thruBlk="1"/>
+      </p:transition>
+    </mc:Choice>
+    <mc:Fallback>
+      <p:transition xmlns:p14="http://schemas.microsoft.com/office/powerpoint/2010/main" spd="slow" advClick="0">
+        <p:fade thruBlk="1"/>
+      </p:transition>
+    </mc:Fallback>
+  </mc:AlternateContent>
   <p:timing>
     <p:tnLst>
       <p:par>
@@ -13124,9 +13070,18 @@
   <p:clrMapOvr>
     <a:masterClrMapping/>
   </p:clrMapOvr>
-  <p:transition xmlns:p14="http://schemas.microsoft.com/office/powerpoint/2010/main" spd="slow" advClick="0">
-    <p:fade thruBlk="1"/>
-  </p:transition>
+  <mc:AlternateContent xmlns:mc="http://schemas.openxmlformats.org/markup-compatibility/2006">
+    <mc:Choice xmlns:p14="http://schemas.microsoft.com/office/powerpoint/2010/main" Requires="p14">
+      <p:transition spd="slow" p14:dur="800" advClick="0">
+        <p:fade thruBlk="1"/>
+      </p:transition>
+    </mc:Choice>
+    <mc:Fallback>
+      <p:transition xmlns:p14="http://schemas.microsoft.com/office/powerpoint/2010/main" spd="slow" advClick="0">
+        <p:fade thruBlk="1"/>
+      </p:transition>
+    </mc:Fallback>
+  </mc:AlternateContent>
   <p:timing>
     <p:tnLst>
       <p:par>
@@ -13328,7 +13283,7 @@
         <p:spPr bwMode="auto">
           <a:xfrm>
             <a:off x="428625" y="2095500"/>
-            <a:ext cx="8181975" cy="2586038"/>
+            <a:ext cx="8181975" cy="2585323"/>
           </a:xfrm>
           <a:prstGeom prst="rect">
             <a:avLst/>
@@ -13348,23 +13303,47 @@
           <a:lstStyle/>
           <a:p>
             <a:r>
+              <a:rPr lang="en-US" sz="5400" b="1" dirty="0">
+                <a:solidFill>
+                  <a:srgbClr val="0000FF"/>
+                </a:solidFill>
+                <a:latin typeface="Comic Sans MS" pitchFamily="66" charset="0"/>
+              </a:rPr>
+              <a:t>The answer is on </a:t>
+            </a:r>
+            <a:r>
               <a:rPr lang="en-US" sz="5400" b="1">
                 <a:solidFill>
                   <a:srgbClr val="0000FF"/>
                 </a:solidFill>
                 <a:latin typeface="Comic Sans MS" pitchFamily="66" charset="0"/>
               </a:rPr>
-              <a:t>The answer is on my desk!</a:t>
-            </a:r>
-          </a:p>
-          <a:p>
-            <a:r>
-              <a:rPr lang="en-US" sz="5400">
+              <a:t>my </a:t>
+            </a:r>
+            <a:r>
+              <a:rPr lang="en-US" sz="5400" b="1" smtClean="0">
+                <a:solidFill>
+                  <a:srgbClr val="0000FF"/>
+                </a:solidFill>
+                <a:latin typeface="Comic Sans MS" pitchFamily="66" charset="0"/>
+              </a:rPr>
+              <a:t>table!</a:t>
+            </a:r>
+            <a:endParaRPr lang="en-US" sz="5400" b="1" dirty="0">
+              <a:solidFill>
+                <a:srgbClr val="0000FF"/>
+              </a:solidFill>
+              <a:latin typeface="Comic Sans MS" pitchFamily="66" charset="0"/>
+            </a:endParaRPr>
+          </a:p>
+          <a:p>
+            <a:r>
+              <a:rPr lang="en-US" sz="5400" dirty="0">
                 <a:latin typeface="Comic Sans MS" pitchFamily="66" charset="0"/>
               </a:rPr>
               <a:t>(Proof by Cases)</a:t>
             </a:r>
-            <a:endParaRPr lang="en-US" sz="14200" b="1">
+            <a:endParaRPr lang="en-US" sz="14200" b="1" dirty="0">
               <a:solidFill>
                 <a:srgbClr val="0000FF"/>
               </a:solidFill>

</xml_diff>